<commit_message>
done merging coal with gas
</commit_message>
<xml_diff>
--- a/deliberable/lab_talk_presentation.pptx
+++ b/deliberable/lab_talk_presentation.pptx
@@ -5,7 +5,7 @@
     <p:sldMasterId id="2147483648" r:id="rId1"/>
   </p:sldMasterIdLst>
   <p:notesMasterIdLst>
-    <p:notesMasterId r:id="rId34"/>
+    <p:notesMasterId r:id="rId33"/>
   </p:notesMasterIdLst>
   <p:sldIdLst>
     <p:sldId id="256" r:id="rId2"/>
@@ -14,32 +14,31 @@
     <p:sldId id="264" r:id="rId5"/>
     <p:sldId id="260" r:id="rId6"/>
     <p:sldId id="261" r:id="rId7"/>
-    <p:sldId id="259" r:id="rId8"/>
-    <p:sldId id="262" r:id="rId9"/>
-    <p:sldId id="265" r:id="rId10"/>
-    <p:sldId id="267" r:id="rId11"/>
-    <p:sldId id="268" r:id="rId12"/>
-    <p:sldId id="269" r:id="rId13"/>
-    <p:sldId id="271" r:id="rId14"/>
-    <p:sldId id="272" r:id="rId15"/>
-    <p:sldId id="273" r:id="rId16"/>
-    <p:sldId id="274" r:id="rId17"/>
-    <p:sldId id="275" r:id="rId18"/>
-    <p:sldId id="276" r:id="rId19"/>
-    <p:sldId id="277" r:id="rId20"/>
-    <p:sldId id="278" r:id="rId21"/>
-    <p:sldId id="279" r:id="rId22"/>
-    <p:sldId id="280" r:id="rId23"/>
-    <p:sldId id="263" r:id="rId24"/>
-    <p:sldId id="282" r:id="rId25"/>
-    <p:sldId id="285" r:id="rId26"/>
-    <p:sldId id="286" r:id="rId27"/>
-    <p:sldId id="287" r:id="rId28"/>
-    <p:sldId id="288" r:id="rId29"/>
-    <p:sldId id="289" r:id="rId30"/>
-    <p:sldId id="290" r:id="rId31"/>
-    <p:sldId id="291" r:id="rId32"/>
-    <p:sldId id="293" r:id="rId33"/>
+    <p:sldId id="262" r:id="rId8"/>
+    <p:sldId id="265" r:id="rId9"/>
+    <p:sldId id="267" r:id="rId10"/>
+    <p:sldId id="268" r:id="rId11"/>
+    <p:sldId id="269" r:id="rId12"/>
+    <p:sldId id="271" r:id="rId13"/>
+    <p:sldId id="272" r:id="rId14"/>
+    <p:sldId id="273" r:id="rId15"/>
+    <p:sldId id="274" r:id="rId16"/>
+    <p:sldId id="275" r:id="rId17"/>
+    <p:sldId id="276" r:id="rId18"/>
+    <p:sldId id="277" r:id="rId19"/>
+    <p:sldId id="278" r:id="rId20"/>
+    <p:sldId id="279" r:id="rId21"/>
+    <p:sldId id="280" r:id="rId22"/>
+    <p:sldId id="263" r:id="rId23"/>
+    <p:sldId id="282" r:id="rId24"/>
+    <p:sldId id="285" r:id="rId25"/>
+    <p:sldId id="286" r:id="rId26"/>
+    <p:sldId id="287" r:id="rId27"/>
+    <p:sldId id="288" r:id="rId28"/>
+    <p:sldId id="289" r:id="rId29"/>
+    <p:sldId id="290" r:id="rId30"/>
+    <p:sldId id="291" r:id="rId31"/>
+    <p:sldId id="293" r:id="rId32"/>
   </p:sldIdLst>
   <p:sldSz cx="12192000" cy="6858000"/>
   <p:notesSz cx="6858000" cy="9144000"/>
@@ -138,6 +137,11 @@
       </a:defRPr>
     </a:lvl9pPr>
   </p:defaultTextStyle>
+  <p:extLst>
+    <p:ext uri="{EFAFB233-063F-42B5-8137-9DF3F51BA10A}">
+      <p15:sldGuideLst xmlns:p15="http://schemas.microsoft.com/office/powerpoint/2012/main"/>
+    </p:ext>
+  </p:extLst>
 </p:presentation>
 </file>
 
@@ -223,7 +227,7 @@
           <a:p>
             <a:fld id="{7ED9C094-EA8B-46A1-8529-AC49EC62DC55}" type="datetimeFigureOut">
               <a:rPr lang="en-US" smtClean="0"/>
-              <a:t>4/8/2022</a:t>
+              <a:t>5/5/2022</a:t>
             </a:fld>
             <a:endParaRPr lang="en-US" dirty="0"/>
           </a:p>
@@ -1053,7 +1057,7 @@
           <a:p>
             <a:fld id="{82879282-E023-42B3-B1BB-070CC79268A2}" type="datetimeFigureOut">
               <a:rPr lang="en-US" smtClean="0"/>
-              <a:t>4/8/2022</a:t>
+              <a:t>5/5/2022</a:t>
             </a:fld>
             <a:endParaRPr lang="en-US" dirty="0"/>
           </a:p>
@@ -1251,7 +1255,7 @@
           <a:p>
             <a:fld id="{82879282-E023-42B3-B1BB-070CC79268A2}" type="datetimeFigureOut">
               <a:rPr lang="en-US" smtClean="0"/>
-              <a:t>4/8/2022</a:t>
+              <a:t>5/5/2022</a:t>
             </a:fld>
             <a:endParaRPr lang="en-US" dirty="0"/>
           </a:p>
@@ -1459,7 +1463,7 @@
           <a:p>
             <a:fld id="{82879282-E023-42B3-B1BB-070CC79268A2}" type="datetimeFigureOut">
               <a:rPr lang="en-US" smtClean="0"/>
-              <a:t>4/8/2022</a:t>
+              <a:t>5/5/2022</a:t>
             </a:fld>
             <a:endParaRPr lang="en-US" dirty="0"/>
           </a:p>
@@ -2504,7 +2508,7 @@
           <a:p>
             <a:fld id="{82879282-E023-42B3-B1BB-070CC79268A2}" type="datetimeFigureOut">
               <a:rPr lang="en-US" smtClean="0"/>
-              <a:t>4/8/2022</a:t>
+              <a:t>5/5/2022</a:t>
             </a:fld>
             <a:endParaRPr lang="en-US" dirty="0"/>
           </a:p>
@@ -2779,7 +2783,7 @@
           <a:p>
             <a:fld id="{82879282-E023-42B3-B1BB-070CC79268A2}" type="datetimeFigureOut">
               <a:rPr lang="en-US" smtClean="0"/>
-              <a:t>4/8/2022</a:t>
+              <a:t>5/5/2022</a:t>
             </a:fld>
             <a:endParaRPr lang="en-US" dirty="0"/>
           </a:p>
@@ -3044,7 +3048,7 @@
           <a:p>
             <a:fld id="{82879282-E023-42B3-B1BB-070CC79268A2}" type="datetimeFigureOut">
               <a:rPr lang="en-US" smtClean="0"/>
-              <a:t>4/8/2022</a:t>
+              <a:t>5/5/2022</a:t>
             </a:fld>
             <a:endParaRPr lang="en-US" dirty="0"/>
           </a:p>
@@ -3456,7 +3460,7 @@
           <a:p>
             <a:fld id="{82879282-E023-42B3-B1BB-070CC79268A2}" type="datetimeFigureOut">
               <a:rPr lang="en-US" smtClean="0"/>
-              <a:t>4/8/2022</a:t>
+              <a:t>5/5/2022</a:t>
             </a:fld>
             <a:endParaRPr lang="en-US" dirty="0"/>
           </a:p>
@@ -3597,7 +3601,7 @@
           <a:p>
             <a:fld id="{82879282-E023-42B3-B1BB-070CC79268A2}" type="datetimeFigureOut">
               <a:rPr lang="en-US" smtClean="0"/>
-              <a:t>4/8/2022</a:t>
+              <a:t>5/5/2022</a:t>
             </a:fld>
             <a:endParaRPr lang="en-US" dirty="0"/>
           </a:p>
@@ -3710,7 +3714,7 @@
           <a:p>
             <a:fld id="{82879282-E023-42B3-B1BB-070CC79268A2}" type="datetimeFigureOut">
               <a:rPr lang="en-US" smtClean="0"/>
-              <a:t>4/8/2022</a:t>
+              <a:t>5/5/2022</a:t>
             </a:fld>
             <a:endParaRPr lang="en-US" dirty="0"/>
           </a:p>
@@ -4021,7 +4025,7 @@
           <a:p>
             <a:fld id="{82879282-E023-42B3-B1BB-070CC79268A2}" type="datetimeFigureOut">
               <a:rPr lang="en-US" smtClean="0"/>
-              <a:t>4/8/2022</a:t>
+              <a:t>5/5/2022</a:t>
             </a:fld>
             <a:endParaRPr lang="en-US" dirty="0"/>
           </a:p>
@@ -4309,7 +4313,7 @@
           <a:p>
             <a:fld id="{82879282-E023-42B3-B1BB-070CC79268A2}" type="datetimeFigureOut">
               <a:rPr lang="en-US" smtClean="0"/>
-              <a:t>4/8/2022</a:t>
+              <a:t>5/5/2022</a:t>
             </a:fld>
             <a:endParaRPr lang="en-US" dirty="0"/>
           </a:p>
@@ -4550,7 +4554,7 @@
           <a:p>
             <a:fld id="{82879282-E023-42B3-B1BB-070CC79268A2}" type="datetimeFigureOut">
               <a:rPr lang="en-US" smtClean="0"/>
-              <a:t>4/8/2022</a:t>
+              <a:t>5/5/2022</a:t>
             </a:fld>
             <a:endParaRPr lang="en-US" dirty="0"/>
           </a:p>
@@ -5057,66 +5061,6 @@
           <a:chExt cx="0" cy="0"/>
         </a:xfrm>
       </p:grpSpPr>
-      <p:pic>
-        <p:nvPicPr>
-          <p:cNvPr id="3" name="Picture 2">
-            <a:extLst>
-              <a:ext uri="{FF2B5EF4-FFF2-40B4-BE49-F238E27FC236}">
-                <a16:creationId xmlns:a16="http://schemas.microsoft.com/office/drawing/2014/main" id="{43B71F01-3A43-4B3E-BBE0-E6C8FED153E9}"/>
-              </a:ext>
-            </a:extLst>
-          </p:cNvPr>
-          <p:cNvPicPr>
-            <a:picLocks noChangeAspect="1"/>
-          </p:cNvPicPr>
-          <p:nvPr/>
-        </p:nvPicPr>
-        <p:blipFill>
-          <a:blip r:embed="rId2"/>
-          <a:stretch>
-            <a:fillRect/>
-          </a:stretch>
-        </p:blipFill>
-        <p:spPr>
-          <a:xfrm>
-            <a:off x="1404283" y="1114102"/>
-            <a:ext cx="9383434" cy="4629796"/>
-          </a:xfrm>
-          <a:prstGeom prst="rect">
-            <a:avLst/>
-          </a:prstGeom>
-        </p:spPr>
-      </p:pic>
-    </p:spTree>
-    <p:extLst>
-      <p:ext uri="{BB962C8B-B14F-4D97-AF65-F5344CB8AC3E}">
-        <p14:creationId xmlns:p14="http://schemas.microsoft.com/office/powerpoint/2010/main" val="364002905"/>
-      </p:ext>
-    </p:extLst>
-  </p:cSld>
-  <p:clrMapOvr>
-    <a:masterClrMapping/>
-  </p:clrMapOvr>
-</p:sld>
-</file>
-
-<file path=ppt/slides/slide11.xml><?xml version="1.0" encoding="utf-8"?>
-<p:sld xmlns:a="http://schemas.openxmlformats.org/drawingml/2006/main" xmlns:r="http://schemas.openxmlformats.org/officeDocument/2006/relationships" xmlns:p="http://schemas.openxmlformats.org/presentationml/2006/main">
-  <p:cSld>
-    <p:spTree>
-      <p:nvGrpSpPr>
-        <p:cNvPr id="1" name=""/>
-        <p:cNvGrpSpPr/>
-        <p:nvPr/>
-      </p:nvGrpSpPr>
-      <p:grpSpPr>
-        <a:xfrm>
-          <a:off x="0" y="0"/>
-          <a:ext cx="0" cy="0"/>
-          <a:chOff x="0" y="0"/>
-          <a:chExt cx="0" cy="0"/>
-        </a:xfrm>
-      </p:grpSpPr>
       <p:sp>
         <p:nvSpPr>
           <p:cNvPr id="4" name="Title 3">
@@ -5165,7 +5109,7 @@
 </p:sld>
 </file>
 
-<file path=ppt/slides/slide12.xml><?xml version="1.0" encoding="utf-8"?>
+<file path=ppt/slides/slide11.xml><?xml version="1.0" encoding="utf-8"?>
 <p:sld xmlns:a="http://schemas.openxmlformats.org/drawingml/2006/main" xmlns:r="http://schemas.openxmlformats.org/officeDocument/2006/relationships" xmlns:p="http://schemas.openxmlformats.org/presentationml/2006/main">
   <p:cSld>
     <p:spTree>
@@ -5242,6 +5186,131 @@
 </p:sld>
 </file>
 
+<file path=ppt/slides/slide12.xml><?xml version="1.0" encoding="utf-8"?>
+<p:sld xmlns:a="http://schemas.openxmlformats.org/drawingml/2006/main" xmlns:r="http://schemas.openxmlformats.org/officeDocument/2006/relationships" xmlns:p="http://schemas.openxmlformats.org/presentationml/2006/main">
+  <p:cSld>
+    <p:spTree>
+      <p:nvGrpSpPr>
+        <p:cNvPr id="1" name=""/>
+        <p:cNvGrpSpPr/>
+        <p:nvPr/>
+      </p:nvGrpSpPr>
+      <p:grpSpPr>
+        <a:xfrm>
+          <a:off x="0" y="0"/>
+          <a:ext cx="0" cy="0"/>
+          <a:chOff x="0" y="0"/>
+          <a:chExt cx="0" cy="0"/>
+        </a:xfrm>
+      </p:grpSpPr>
+      <p:sp>
+        <p:nvSpPr>
+          <p:cNvPr id="2" name="Title 1">
+            <a:extLst>
+              <a:ext uri="{FF2B5EF4-FFF2-40B4-BE49-F238E27FC236}">
+                <a16:creationId xmlns:a16="http://schemas.microsoft.com/office/drawing/2014/main" id="{632ED0FD-0F78-430A-BD70-F58B4A30DBB8}"/>
+              </a:ext>
+            </a:extLst>
+          </p:cNvPr>
+          <p:cNvSpPr>
+            <a:spLocks noGrp="1"/>
+          </p:cNvSpPr>
+          <p:nvPr>
+            <p:ph type="title"/>
+          </p:nvPr>
+        </p:nvSpPr>
+        <p:spPr/>
+        <p:txBody>
+          <a:bodyPr/>
+          <a:lstStyle/>
+          <a:p>
+            <a:r>
+              <a:rPr lang="en-US" dirty="0"/>
+              <a:t>Firm power as exogenous parameters</a:t>
+            </a:r>
+          </a:p>
+        </p:txBody>
+      </p:sp>
+      <p:sp>
+        <p:nvSpPr>
+          <p:cNvPr id="3" name="Content Placeholder 2">
+            <a:extLst>
+              <a:ext uri="{FF2B5EF4-FFF2-40B4-BE49-F238E27FC236}">
+                <a16:creationId xmlns:a16="http://schemas.microsoft.com/office/drawing/2014/main" id="{78875584-DF89-483C-A6F8-97AAEC9F05EA}"/>
+              </a:ext>
+            </a:extLst>
+          </p:cNvPr>
+          <p:cNvSpPr>
+            <a:spLocks noGrp="1"/>
+          </p:cNvSpPr>
+          <p:nvPr>
+            <p:ph idx="1"/>
+          </p:nvPr>
+        </p:nvSpPr>
+        <p:spPr/>
+        <p:txBody>
+          <a:bodyPr/>
+          <a:lstStyle/>
+          <a:p>
+            <a:r>
+              <a:rPr lang="en-US" dirty="0"/>
+              <a:t>Taking firm power as exogenous parameters/inputs</a:t>
+            </a:r>
+          </a:p>
+          <a:p>
+            <a:pPr lvl="1"/>
+            <a:r>
+              <a:rPr lang="en-US" dirty="0"/>
+              <a:t>250 GW Combined Heat and Power (CHP) with carbon capture and sequestration (CCS) [heating]</a:t>
+            </a:r>
+          </a:p>
+          <a:p>
+            <a:pPr lvl="1"/>
+            <a:r>
+              <a:rPr lang="en-US" dirty="0"/>
+              <a:t>110 GW of Bioenergy with CCS (BECCS) [negative sink]</a:t>
+            </a:r>
+          </a:p>
+          <a:p>
+            <a:pPr lvl="1"/>
+            <a:r>
+              <a:rPr lang="en-US" dirty="0"/>
+              <a:t>218 GW nuclear </a:t>
+            </a:r>
+          </a:p>
+          <a:p>
+            <a:pPr lvl="1"/>
+            <a:r>
+              <a:rPr lang="en-US" dirty="0"/>
+              <a:t>580 GW hydro </a:t>
+            </a:r>
+          </a:p>
+          <a:p>
+            <a:pPr lvl="1"/>
+            <a:r>
+              <a:rPr lang="en-US" dirty="0"/>
+              <a:t>320 GW natural gas with CCS (NGCCS)</a:t>
+            </a:r>
+          </a:p>
+          <a:p>
+            <a:pPr lvl="1"/>
+            <a:endParaRPr lang="en-US" dirty="0"/>
+          </a:p>
+        </p:txBody>
+      </p:sp>
+    </p:spTree>
+    <p:extLst>
+      <p:ext uri="{BB962C8B-B14F-4D97-AF65-F5344CB8AC3E}">
+        <p14:creationId xmlns:p14="http://schemas.microsoft.com/office/powerpoint/2010/main" val="2242196371"/>
+      </p:ext>
+    </p:extLst>
+  </p:cSld>
+  <p:clrMapOvr>
+    <a:masterClrMapping/>
+  </p:clrMapOvr>
+</p:sld>
+</file>
+
 <file path=ppt/slides/slide13.xml><?xml version="1.0" encoding="utf-8"?>
 <p:sld xmlns:a="http://schemas.openxmlformats.org/drawingml/2006/main" xmlns:r="http://schemas.openxmlformats.org/officeDocument/2006/relationships" xmlns:p="http://schemas.openxmlformats.org/presentationml/2006/main">
   <p:cSld>
@@ -5264,7 +5333,7 @@
           <p:cNvPr id="2" name="Title 1">
             <a:extLst>
               <a:ext uri="{FF2B5EF4-FFF2-40B4-BE49-F238E27FC236}">
-                <a16:creationId xmlns:a16="http://schemas.microsoft.com/office/drawing/2014/main" id="{632ED0FD-0F78-430A-BD70-F58B4A30DBB8}"/>
+                <a16:creationId xmlns:a16="http://schemas.microsoft.com/office/drawing/2014/main" id="{74FEC5CD-0812-4916-A04C-4940AB9D8FDB}"/>
               </a:ext>
             </a:extLst>
           </p:cNvPr>
@@ -5282,7 +5351,7 @@
           <a:p>
             <a:r>
               <a:rPr lang="en-US" dirty="0"/>
-              <a:t>Firm power as exogenous parameters</a:t>
+              <a:t>Decision variables: renewable, transmission, storage </a:t>
             </a:r>
           </a:p>
         </p:txBody>
@@ -5292,7 +5361,7 @@
           <p:cNvPr id="3" name="Content Placeholder 2">
             <a:extLst>
               <a:ext uri="{FF2B5EF4-FFF2-40B4-BE49-F238E27FC236}">
-                <a16:creationId xmlns:a16="http://schemas.microsoft.com/office/drawing/2014/main" id="{78875584-DF89-483C-A6F8-97AAEC9F05EA}"/>
+                <a16:creationId xmlns:a16="http://schemas.microsoft.com/office/drawing/2014/main" id="{FE2C2B33-2216-4F9F-B471-F28B335E898D}"/>
               </a:ext>
             </a:extLst>
           </p:cNvPr>
@@ -5310,46 +5379,85 @@
           <a:p>
             <a:r>
               <a:rPr lang="en-US" dirty="0"/>
-              <a:t>Taking firm power as exogenous parameters/inputs</a:t>
+              <a:t>Tuning for decision variables:</a:t>
             </a:r>
           </a:p>
           <a:p>
             <a:pPr lvl="1"/>
             <a:r>
               <a:rPr lang="en-US" dirty="0"/>
-              <a:t>250 GW Combined Heat and Power (CHP) with carbon capture and sequestration (CCS) [heating]</a:t>
+              <a:t>Wind </a:t>
+            </a:r>
+          </a:p>
+          <a:p>
+            <a:pPr lvl="2"/>
+            <a:r>
+              <a:rPr lang="en-US" dirty="0"/>
+              <a:t>on-shore </a:t>
+            </a:r>
+          </a:p>
+          <a:p>
+            <a:pPr lvl="2"/>
+            <a:r>
+              <a:rPr lang="en-US" dirty="0"/>
+              <a:t>off-shore</a:t>
             </a:r>
           </a:p>
           <a:p>
             <a:pPr lvl="1"/>
             <a:r>
               <a:rPr lang="en-US" dirty="0"/>
-              <a:t>110 GW of Bioenergy with CCS (BECCS) [negative sink]</a:t>
+              <a:t>Solar PV</a:t>
             </a:r>
           </a:p>
           <a:p>
             <a:pPr lvl="1"/>
             <a:r>
               <a:rPr lang="en-US" dirty="0"/>
-              <a:t>218 GW nuclear </a:t>
-            </a:r>
-          </a:p>
-          <a:p>
-            <a:pPr lvl="1"/>
+              <a:t>Supporting infrastructures </a:t>
+            </a:r>
+          </a:p>
+          <a:p>
+            <a:pPr lvl="2"/>
             <a:r>
               <a:rPr lang="en-US" dirty="0"/>
-              <a:t>580 GW hydro </a:t>
-            </a:r>
-          </a:p>
-          <a:p>
-            <a:pPr lvl="1"/>
+              <a:t>Transmission </a:t>
+            </a:r>
+          </a:p>
+          <a:p>
+            <a:pPr lvl="3"/>
             <a:r>
               <a:rPr lang="en-US" dirty="0"/>
-              <a:t>320 GW natural gas with CCS (NGCCS)</a:t>
-            </a:r>
-          </a:p>
-          <a:p>
-            <a:pPr lvl="1"/>
+              <a:t>Inter-provincial high voltage transmission line capacity </a:t>
+            </a:r>
+          </a:p>
+          <a:p>
+            <a:pPr lvl="3"/>
+            <a:r>
+              <a:rPr lang="en-US" dirty="0"/>
+              <a:t>Intra-provincial spur and trunk lines </a:t>
+            </a:r>
+          </a:p>
+          <a:p>
+            <a:pPr lvl="2"/>
+            <a:r>
+              <a:rPr lang="en-US" dirty="0"/>
+              <a:t>Energy storage </a:t>
+            </a:r>
+          </a:p>
+          <a:p>
+            <a:pPr lvl="3"/>
+            <a:r>
+              <a:rPr lang="en-US" dirty="0"/>
+              <a:t>Pumped hydro storage (PHS), utility-scale batteries </a:t>
+            </a:r>
+          </a:p>
+          <a:p>
+            <a:pPr lvl="2"/>
+            <a:endParaRPr lang="en-US" dirty="0"/>
+          </a:p>
+          <a:p>
+            <a:pPr lvl="2"/>
             <a:endParaRPr lang="en-US" dirty="0"/>
           </a:p>
         </p:txBody>
@@ -5357,7 +5465,7 @@
     </p:spTree>
     <p:extLst>
       <p:ext uri="{BB962C8B-B14F-4D97-AF65-F5344CB8AC3E}">
-        <p14:creationId xmlns:p14="http://schemas.microsoft.com/office/powerpoint/2010/main" val="2242196371"/>
+        <p14:creationId xmlns:p14="http://schemas.microsoft.com/office/powerpoint/2010/main" val="658603218"/>
       </p:ext>
     </p:extLst>
   </p:cSld>
@@ -5389,170 +5497,6 @@
           <p:cNvPr id="2" name="Title 1">
             <a:extLst>
               <a:ext uri="{FF2B5EF4-FFF2-40B4-BE49-F238E27FC236}">
-                <a16:creationId xmlns:a16="http://schemas.microsoft.com/office/drawing/2014/main" id="{74FEC5CD-0812-4916-A04C-4940AB9D8FDB}"/>
-              </a:ext>
-            </a:extLst>
-          </p:cNvPr>
-          <p:cNvSpPr>
-            <a:spLocks noGrp="1"/>
-          </p:cNvSpPr>
-          <p:nvPr>
-            <p:ph type="title"/>
-          </p:nvPr>
-        </p:nvSpPr>
-        <p:spPr/>
-        <p:txBody>
-          <a:bodyPr/>
-          <a:lstStyle/>
-          <a:p>
-            <a:r>
-              <a:rPr lang="en-US" dirty="0"/>
-              <a:t>Decision variables: renewable, transmission, storage </a:t>
-            </a:r>
-          </a:p>
-        </p:txBody>
-      </p:sp>
-      <p:sp>
-        <p:nvSpPr>
-          <p:cNvPr id="3" name="Content Placeholder 2">
-            <a:extLst>
-              <a:ext uri="{FF2B5EF4-FFF2-40B4-BE49-F238E27FC236}">
-                <a16:creationId xmlns:a16="http://schemas.microsoft.com/office/drawing/2014/main" id="{FE2C2B33-2216-4F9F-B471-F28B335E898D}"/>
-              </a:ext>
-            </a:extLst>
-          </p:cNvPr>
-          <p:cNvSpPr>
-            <a:spLocks noGrp="1"/>
-          </p:cNvSpPr>
-          <p:nvPr>
-            <p:ph idx="1"/>
-          </p:nvPr>
-        </p:nvSpPr>
-        <p:spPr/>
-        <p:txBody>
-          <a:bodyPr/>
-          <a:lstStyle/>
-          <a:p>
-            <a:r>
-              <a:rPr lang="en-US" dirty="0"/>
-              <a:t>Tuning for decision variables:</a:t>
-            </a:r>
-          </a:p>
-          <a:p>
-            <a:pPr lvl="1"/>
-            <a:r>
-              <a:rPr lang="en-US" dirty="0"/>
-              <a:t>Wind </a:t>
-            </a:r>
-          </a:p>
-          <a:p>
-            <a:pPr lvl="2"/>
-            <a:r>
-              <a:rPr lang="en-US" dirty="0"/>
-              <a:t>on-shore </a:t>
-            </a:r>
-          </a:p>
-          <a:p>
-            <a:pPr lvl="2"/>
-            <a:r>
-              <a:rPr lang="en-US" dirty="0"/>
-              <a:t>off-shore</a:t>
-            </a:r>
-          </a:p>
-          <a:p>
-            <a:pPr lvl="1"/>
-            <a:r>
-              <a:rPr lang="en-US" dirty="0"/>
-              <a:t>Solar PV</a:t>
-            </a:r>
-          </a:p>
-          <a:p>
-            <a:pPr lvl="1"/>
-            <a:r>
-              <a:rPr lang="en-US" dirty="0"/>
-              <a:t>Supporting infrastructures </a:t>
-            </a:r>
-          </a:p>
-          <a:p>
-            <a:pPr lvl="2"/>
-            <a:r>
-              <a:rPr lang="en-US" dirty="0"/>
-              <a:t>Transmission </a:t>
-            </a:r>
-          </a:p>
-          <a:p>
-            <a:pPr lvl="3"/>
-            <a:r>
-              <a:rPr lang="en-US" dirty="0"/>
-              <a:t>Inter-provincial high voltage transmission line capacity </a:t>
-            </a:r>
-          </a:p>
-          <a:p>
-            <a:pPr lvl="3"/>
-            <a:r>
-              <a:rPr lang="en-US" dirty="0"/>
-              <a:t>Intra-provincial spur and trunk lines </a:t>
-            </a:r>
-          </a:p>
-          <a:p>
-            <a:pPr lvl="2"/>
-            <a:r>
-              <a:rPr lang="en-US" dirty="0"/>
-              <a:t>Energy storage </a:t>
-            </a:r>
-          </a:p>
-          <a:p>
-            <a:pPr lvl="3"/>
-            <a:r>
-              <a:rPr lang="en-US" dirty="0"/>
-              <a:t>Pumped hydro storage (PHS), utility-scale batteries </a:t>
-            </a:r>
-          </a:p>
-          <a:p>
-            <a:pPr lvl="2"/>
-            <a:endParaRPr lang="en-US" dirty="0"/>
-          </a:p>
-          <a:p>
-            <a:pPr lvl="2"/>
-            <a:endParaRPr lang="en-US" dirty="0"/>
-          </a:p>
-        </p:txBody>
-      </p:sp>
-    </p:spTree>
-    <p:extLst>
-      <p:ext uri="{BB962C8B-B14F-4D97-AF65-F5344CB8AC3E}">
-        <p14:creationId xmlns:p14="http://schemas.microsoft.com/office/powerpoint/2010/main" val="658603218"/>
-      </p:ext>
-    </p:extLst>
-  </p:cSld>
-  <p:clrMapOvr>
-    <a:masterClrMapping/>
-  </p:clrMapOvr>
-</p:sld>
-</file>
-
-<file path=ppt/slides/slide15.xml><?xml version="1.0" encoding="utf-8"?>
-<p:sld xmlns:a="http://schemas.openxmlformats.org/drawingml/2006/main" xmlns:r="http://schemas.openxmlformats.org/officeDocument/2006/relationships" xmlns:p="http://schemas.openxmlformats.org/presentationml/2006/main">
-  <p:cSld>
-    <p:spTree>
-      <p:nvGrpSpPr>
-        <p:cNvPr id="1" name=""/>
-        <p:cNvGrpSpPr/>
-        <p:nvPr/>
-      </p:nvGrpSpPr>
-      <p:grpSpPr>
-        <a:xfrm>
-          <a:off x="0" y="0"/>
-          <a:ext cx="0" cy="0"/>
-          <a:chOff x="0" y="0"/>
-          <a:chExt cx="0" cy="0"/>
-        </a:xfrm>
-      </p:grpSpPr>
-      <p:sp>
-        <p:nvSpPr>
-          <p:cNvPr id="2" name="Title 1">
-            <a:extLst>
-              <a:ext uri="{FF2B5EF4-FFF2-40B4-BE49-F238E27FC236}">
                 <a16:creationId xmlns:a16="http://schemas.microsoft.com/office/drawing/2014/main" id="{31C2BAD4-766D-46B8-9BC6-922EBFC9410D}"/>
               </a:ext>
             </a:extLst>
@@ -5690,7 +5634,7 @@
 </p:sld>
 </file>
 
-<file path=ppt/slides/slide16.xml><?xml version="1.0" encoding="utf-8"?>
+<file path=ppt/slides/slide15.xml><?xml version="1.0" encoding="utf-8"?>
 <p:sld xmlns:a="http://schemas.openxmlformats.org/drawingml/2006/main" xmlns:r="http://schemas.openxmlformats.org/officeDocument/2006/relationships" xmlns:p="http://schemas.openxmlformats.org/presentationml/2006/main">
   <p:cSld>
     <p:spTree>
@@ -5749,7 +5693,7 @@
 </p:sld>
 </file>
 
-<file path=ppt/slides/slide17.xml><?xml version="1.0" encoding="utf-8"?>
+<file path=ppt/slides/slide16.xml><?xml version="1.0" encoding="utf-8"?>
 <p:sld xmlns:a="http://schemas.openxmlformats.org/drawingml/2006/main" xmlns:r="http://schemas.openxmlformats.org/officeDocument/2006/relationships" xmlns:p="http://schemas.openxmlformats.org/presentationml/2006/main">
   <p:cSld>
     <p:bg>
@@ -6229,7 +6173,7 @@
 </p:sld>
 </file>
 
-<file path=ppt/slides/slide18.xml><?xml version="1.0" encoding="utf-8"?>
+<file path=ppt/slides/slide17.xml><?xml version="1.0" encoding="utf-8"?>
 <p:sld xmlns:a="http://schemas.openxmlformats.org/drawingml/2006/main" xmlns:r="http://schemas.openxmlformats.org/officeDocument/2006/relationships" xmlns:p="http://schemas.openxmlformats.org/presentationml/2006/main">
   <p:cSld>
     <p:spTree>
@@ -6320,7 +6264,7 @@
 </p:sld>
 </file>
 
-<file path=ppt/slides/slide19.xml><?xml version="1.0" encoding="utf-8"?>
+<file path=ppt/slides/slide18.xml><?xml version="1.0" encoding="utf-8"?>
 <p:sld xmlns:a="http://schemas.openxmlformats.org/drawingml/2006/main" xmlns:r="http://schemas.openxmlformats.org/officeDocument/2006/relationships" xmlns:p="http://schemas.openxmlformats.org/presentationml/2006/main">
   <p:cSld>
     <p:spTree>
@@ -6435,6 +6379,142 @@
 </p:sld>
 </file>
 
+<file path=ppt/slides/slide19.xml><?xml version="1.0" encoding="utf-8"?>
+<p:sld xmlns:a="http://schemas.openxmlformats.org/drawingml/2006/main" xmlns:r="http://schemas.openxmlformats.org/officeDocument/2006/relationships" xmlns:p="http://schemas.openxmlformats.org/presentationml/2006/main">
+  <p:cSld>
+    <p:spTree>
+      <p:nvGrpSpPr>
+        <p:cNvPr id="1" name="Shape 76"/>
+        <p:cNvGrpSpPr/>
+        <p:nvPr/>
+      </p:nvGrpSpPr>
+      <p:grpSpPr>
+        <a:xfrm>
+          <a:off x="0" y="0"/>
+          <a:ext cx="0" cy="0"/>
+          <a:chOff x="0" y="0"/>
+          <a:chExt cx="0" cy="0"/>
+        </a:xfrm>
+      </p:grpSpPr>
+      <p:sp>
+        <p:nvSpPr>
+          <p:cNvPr id="77" name="Google Shape;77;p17"/>
+          <p:cNvSpPr txBox="1">
+            <a:spLocks noGrp="1"/>
+          </p:cNvSpPr>
+          <p:nvPr>
+            <p:ph type="title"/>
+          </p:nvPr>
+        </p:nvSpPr>
+        <p:spPr>
+          <a:xfrm>
+            <a:off x="415600" y="593367"/>
+            <a:ext cx="11360800" cy="763600"/>
+          </a:xfrm>
+          <a:prstGeom prst="rect">
+            <a:avLst/>
+          </a:prstGeom>
+        </p:spPr>
+        <p:txBody>
+          <a:bodyPr spcFirstLastPara="1" vert="horz" wrap="square" lIns="121900" tIns="121900" rIns="121900" bIns="121900" rtlCol="0" anchor="t" anchorCtr="0">
+            <a:normAutofit fontScale="90000"/>
+          </a:bodyPr>
+          <a:lstStyle/>
+          <a:p>
+            <a:r>
+              <a:rPr lang="en"/>
+              <a:t>Core Ideas</a:t>
+            </a:r>
+            <a:endParaRPr dirty="0"/>
+          </a:p>
+        </p:txBody>
+      </p:sp>
+      <p:sp>
+        <p:nvSpPr>
+          <p:cNvPr id="78" name="Google Shape;78;p17"/>
+          <p:cNvSpPr txBox="1">
+            <a:spLocks noGrp="1"/>
+          </p:cNvSpPr>
+          <p:nvPr>
+            <p:ph type="body" idx="1"/>
+          </p:nvPr>
+        </p:nvSpPr>
+        <p:spPr>
+          <a:xfrm>
+            <a:off x="415600" y="1536633"/>
+            <a:ext cx="11360800" cy="4555200"/>
+          </a:xfrm>
+          <a:prstGeom prst="rect">
+            <a:avLst/>
+          </a:prstGeom>
+        </p:spPr>
+        <p:txBody>
+          <a:bodyPr spcFirstLastPara="1" vert="horz" wrap="square" lIns="121900" tIns="121900" rIns="121900" bIns="121900" rtlCol="0" anchor="t" anchorCtr="0">
+            <a:normAutofit/>
+          </a:bodyPr>
+          <a:lstStyle/>
+          <a:p>
+            <a:r>
+              <a:rPr lang="en" dirty="0"/>
+              <a:t>Run model four times sequentially at 2030, 2040, 2050, and 2060.</a:t>
+            </a:r>
+            <a:endParaRPr dirty="0"/>
+          </a:p>
+          <a:p>
+            <a:r>
+              <a:rPr lang="en" dirty="0"/>
+              <a:t>At the snapshot years, the outputs (</a:t>
+            </a:r>
+            <a:r>
+              <a:rPr lang="en" b="1" dirty="0"/>
+              <a:t>brownfield capacity build</a:t>
+            </a:r>
+            <a:r>
+              <a:rPr lang="en" dirty="0"/>
+              <a:t>) will be used as the inputs for the next model. </a:t>
+            </a:r>
+            <a:endParaRPr dirty="0"/>
+          </a:p>
+          <a:p>
+            <a:r>
+              <a:rPr lang="en" dirty="0"/>
+              <a:t>Hold </a:t>
+            </a:r>
+            <a:r>
+              <a:rPr lang="en" b="1" dirty="0"/>
+              <a:t>exogenous fixed parameters</a:t>
+            </a:r>
+            <a:r>
+              <a:rPr lang="en" dirty="0"/>
+              <a:t> constant for each model across all years.</a:t>
+            </a:r>
+            <a:endParaRPr dirty="0"/>
+          </a:p>
+          <a:p>
+            <a:r>
+              <a:rPr lang="en" dirty="0"/>
+              <a:t>Project </a:t>
+            </a:r>
+            <a:r>
+              <a:rPr lang="en" b="1" dirty="0"/>
+              <a:t>time varying parameters</a:t>
+            </a:r>
+            <a:r>
+              <a:rPr lang="en" dirty="0"/>
+              <a:t> into the future, before feeding them into models as inputs. </a:t>
+            </a:r>
+            <a:endParaRPr dirty="0"/>
+          </a:p>
+        </p:txBody>
+      </p:sp>
+    </p:spTree>
+  </p:cSld>
+  <p:clrMapOvr>
+    <a:masterClrMapping/>
+  </p:clrMapOvr>
+</p:sld>
+</file>
+
 <file path=ppt/slides/slide2.xml><?xml version="1.0" encoding="utf-8"?>
 <p:sld xmlns:a="http://schemas.openxmlformats.org/drawingml/2006/main" xmlns:r="http://schemas.openxmlformats.org/officeDocument/2006/relationships" xmlns:p="http://schemas.openxmlformats.org/presentationml/2006/main">
   <p:cSld>
@@ -6505,142 +6585,6 @@
   <p:cSld>
     <p:spTree>
       <p:nvGrpSpPr>
-        <p:cNvPr id="1" name="Shape 76"/>
-        <p:cNvGrpSpPr/>
-        <p:nvPr/>
-      </p:nvGrpSpPr>
-      <p:grpSpPr>
-        <a:xfrm>
-          <a:off x="0" y="0"/>
-          <a:ext cx="0" cy="0"/>
-          <a:chOff x="0" y="0"/>
-          <a:chExt cx="0" cy="0"/>
-        </a:xfrm>
-      </p:grpSpPr>
-      <p:sp>
-        <p:nvSpPr>
-          <p:cNvPr id="77" name="Google Shape;77;p17"/>
-          <p:cNvSpPr txBox="1">
-            <a:spLocks noGrp="1"/>
-          </p:cNvSpPr>
-          <p:nvPr>
-            <p:ph type="title"/>
-          </p:nvPr>
-        </p:nvSpPr>
-        <p:spPr>
-          <a:xfrm>
-            <a:off x="415600" y="593367"/>
-            <a:ext cx="11360800" cy="763600"/>
-          </a:xfrm>
-          <a:prstGeom prst="rect">
-            <a:avLst/>
-          </a:prstGeom>
-        </p:spPr>
-        <p:txBody>
-          <a:bodyPr spcFirstLastPara="1" vert="horz" wrap="square" lIns="121900" tIns="121900" rIns="121900" bIns="121900" rtlCol="0" anchor="t" anchorCtr="0">
-            <a:normAutofit fontScale="90000"/>
-          </a:bodyPr>
-          <a:lstStyle/>
-          <a:p>
-            <a:r>
-              <a:rPr lang="en"/>
-              <a:t>Core Ideas</a:t>
-            </a:r>
-            <a:endParaRPr dirty="0"/>
-          </a:p>
-        </p:txBody>
-      </p:sp>
-      <p:sp>
-        <p:nvSpPr>
-          <p:cNvPr id="78" name="Google Shape;78;p17"/>
-          <p:cNvSpPr txBox="1">
-            <a:spLocks noGrp="1"/>
-          </p:cNvSpPr>
-          <p:nvPr>
-            <p:ph type="body" idx="1"/>
-          </p:nvPr>
-        </p:nvSpPr>
-        <p:spPr>
-          <a:xfrm>
-            <a:off x="415600" y="1536633"/>
-            <a:ext cx="11360800" cy="4555200"/>
-          </a:xfrm>
-          <a:prstGeom prst="rect">
-            <a:avLst/>
-          </a:prstGeom>
-        </p:spPr>
-        <p:txBody>
-          <a:bodyPr spcFirstLastPara="1" vert="horz" wrap="square" lIns="121900" tIns="121900" rIns="121900" bIns="121900" rtlCol="0" anchor="t" anchorCtr="0">
-            <a:normAutofit/>
-          </a:bodyPr>
-          <a:lstStyle/>
-          <a:p>
-            <a:r>
-              <a:rPr lang="en" dirty="0"/>
-              <a:t>Run model four times sequentially at 2030, 2040, 2050, and 2060.</a:t>
-            </a:r>
-            <a:endParaRPr dirty="0"/>
-          </a:p>
-          <a:p>
-            <a:r>
-              <a:rPr lang="en" dirty="0"/>
-              <a:t>At the snapshot years, the outputs (</a:t>
-            </a:r>
-            <a:r>
-              <a:rPr lang="en" b="1" dirty="0"/>
-              <a:t>brownfield capacity build</a:t>
-            </a:r>
-            <a:r>
-              <a:rPr lang="en" dirty="0"/>
-              <a:t>) will be used as the inputs for the next model. </a:t>
-            </a:r>
-            <a:endParaRPr dirty="0"/>
-          </a:p>
-          <a:p>
-            <a:r>
-              <a:rPr lang="en" dirty="0"/>
-              <a:t>Hold </a:t>
-            </a:r>
-            <a:r>
-              <a:rPr lang="en" b="1" dirty="0"/>
-              <a:t>exogenous fixed parameters</a:t>
-            </a:r>
-            <a:r>
-              <a:rPr lang="en" dirty="0"/>
-              <a:t> constant for each model across all years.</a:t>
-            </a:r>
-            <a:endParaRPr dirty="0"/>
-          </a:p>
-          <a:p>
-            <a:r>
-              <a:rPr lang="en" dirty="0"/>
-              <a:t>Project </a:t>
-            </a:r>
-            <a:r>
-              <a:rPr lang="en" b="1" dirty="0"/>
-              <a:t>time varying parameters</a:t>
-            </a:r>
-            <a:r>
-              <a:rPr lang="en" dirty="0"/>
-              <a:t> into the future, before feeding them into models as inputs. </a:t>
-            </a:r>
-            <a:endParaRPr dirty="0"/>
-          </a:p>
-        </p:txBody>
-      </p:sp>
-    </p:spTree>
-  </p:cSld>
-  <p:clrMapOvr>
-    <a:masterClrMapping/>
-  </p:clrMapOvr>
-</p:sld>
-</file>
-
-<file path=ppt/slides/slide21.xml><?xml version="1.0" encoding="utf-8"?>
-<p:sld xmlns:a="http://schemas.openxmlformats.org/drawingml/2006/main" xmlns:r="http://schemas.openxmlformats.org/officeDocument/2006/relationships" xmlns:p="http://schemas.openxmlformats.org/presentationml/2006/main">
-  <p:cSld>
-    <p:spTree>
-      <p:nvGrpSpPr>
         <p:cNvPr id="1" name="Shape 82"/>
         <p:cNvGrpSpPr/>
         <p:nvPr/>
@@ -7073,7 +7017,7 @@
 </p:sld>
 </file>
 
-<file path=ppt/slides/slide22.xml><?xml version="1.0" encoding="utf-8"?>
+<file path=ppt/slides/slide21.xml><?xml version="1.0" encoding="utf-8"?>
 <p:sld xmlns:a="http://schemas.openxmlformats.org/drawingml/2006/main" xmlns:r="http://schemas.openxmlformats.org/officeDocument/2006/relationships" xmlns:p="http://schemas.openxmlformats.org/presentationml/2006/main">
   <p:cSld>
     <p:spTree>
@@ -7394,7 +7338,7 @@
 </p:sld>
 </file>
 
-<file path=ppt/slides/slide23.xml><?xml version="1.0" encoding="utf-8"?>
+<file path=ppt/slides/slide22.xml><?xml version="1.0" encoding="utf-8"?>
 <p:sld xmlns:a="http://schemas.openxmlformats.org/drawingml/2006/main" xmlns:r="http://schemas.openxmlformats.org/officeDocument/2006/relationships" xmlns:p="http://schemas.openxmlformats.org/presentationml/2006/main">
   <p:cSld>
     <p:spTree>
@@ -7580,6 +7524,69 @@
         </p:txBody>
       </p:sp>
     </p:spTree>
+  </p:cSld>
+  <p:clrMapOvr>
+    <a:masterClrMapping/>
+  </p:clrMapOvr>
+</p:sld>
+</file>
+
+<file path=ppt/slides/slide23.xml><?xml version="1.0" encoding="utf-8"?>
+<p:sld xmlns:a="http://schemas.openxmlformats.org/drawingml/2006/main" xmlns:r="http://schemas.openxmlformats.org/officeDocument/2006/relationships" xmlns:p="http://schemas.openxmlformats.org/presentationml/2006/main">
+  <p:cSld>
+    <p:spTree>
+      <p:nvGrpSpPr>
+        <p:cNvPr id="1" name=""/>
+        <p:cNvGrpSpPr/>
+        <p:nvPr/>
+      </p:nvGrpSpPr>
+      <p:grpSpPr>
+        <a:xfrm>
+          <a:off x="0" y="0"/>
+          <a:ext cx="0" cy="0"/>
+          <a:chOff x="0" y="0"/>
+          <a:chExt cx="0" cy="0"/>
+        </a:xfrm>
+      </p:grpSpPr>
+      <p:sp>
+        <p:nvSpPr>
+          <p:cNvPr id="2" name="Title 1">
+            <a:extLst>
+              <a:ext uri="{FF2B5EF4-FFF2-40B4-BE49-F238E27FC236}">
+                <a16:creationId xmlns:a16="http://schemas.microsoft.com/office/drawing/2014/main" id="{833981C6-998D-4097-91E9-436047194941}"/>
+              </a:ext>
+            </a:extLst>
+          </p:cNvPr>
+          <p:cNvSpPr>
+            <a:spLocks noGrp="1"/>
+          </p:cNvSpPr>
+          <p:nvPr>
+            <p:ph type="title"/>
+          </p:nvPr>
+        </p:nvSpPr>
+        <p:spPr>
+          <a:xfrm>
+            <a:off x="838200" y="2766218"/>
+            <a:ext cx="10515600" cy="1325563"/>
+          </a:xfrm>
+        </p:spPr>
+        <p:txBody>
+          <a:bodyPr/>
+          <a:lstStyle/>
+          <a:p>
+            <a:r>
+              <a:rPr lang="en-US" dirty="0"/>
+              <a:t>Challenge: unabated firm power phaseout, especially coal</a:t>
+            </a:r>
+          </a:p>
+        </p:txBody>
+      </p:sp>
+    </p:spTree>
+    <p:extLst>
+      <p:ext uri="{BB962C8B-B14F-4D97-AF65-F5344CB8AC3E}">
+        <p14:creationId xmlns:p14="http://schemas.microsoft.com/office/powerpoint/2010/main" val="977781073"/>
+      </p:ext>
+    </p:extLst>
   </p:cSld>
   <p:clrMapOvr>
     <a:masterClrMapping/>
@@ -7609,7 +7616,7 @@
           <p:cNvPr id="2" name="Title 1">
             <a:extLst>
               <a:ext uri="{FF2B5EF4-FFF2-40B4-BE49-F238E27FC236}">
-                <a16:creationId xmlns:a16="http://schemas.microsoft.com/office/drawing/2014/main" id="{833981C6-998D-4097-91E9-436047194941}"/>
+                <a16:creationId xmlns:a16="http://schemas.microsoft.com/office/drawing/2014/main" id="{244C98A3-D7EE-4284-A54E-A30107CD566A}"/>
               </a:ext>
             </a:extLst>
           </p:cNvPr>
@@ -7620,19 +7627,54 @@
             <p:ph type="title"/>
           </p:nvPr>
         </p:nvSpPr>
-        <p:spPr>
-          <a:xfrm>
-            <a:off x="838200" y="2766218"/>
-            <a:ext cx="10515600" cy="1325563"/>
-          </a:xfrm>
-        </p:spPr>
+        <p:spPr/>
         <p:txBody>
           <a:bodyPr/>
           <a:lstStyle/>
           <a:p>
             <a:r>
               <a:rPr lang="en-US" dirty="0"/>
-              <a:t>Challenge: unabated firm power phaseout, especially coal</a:t>
+              <a:t>Specifically…</a:t>
+            </a:r>
+          </a:p>
+        </p:txBody>
+      </p:sp>
+      <p:sp>
+        <p:nvSpPr>
+          <p:cNvPr id="3" name="Content Placeholder 2">
+            <a:extLst>
+              <a:ext uri="{FF2B5EF4-FFF2-40B4-BE49-F238E27FC236}">
+                <a16:creationId xmlns:a16="http://schemas.microsoft.com/office/drawing/2014/main" id="{DDBCCAB8-217C-4935-963D-F198DA29F06E}"/>
+              </a:ext>
+            </a:extLst>
+          </p:cNvPr>
+          <p:cNvSpPr>
+            <a:spLocks noGrp="1"/>
+          </p:cNvSpPr>
+          <p:nvPr>
+            <p:ph idx="1"/>
+          </p:nvPr>
+        </p:nvSpPr>
+        <p:spPr/>
+        <p:txBody>
+          <a:bodyPr/>
+          <a:lstStyle/>
+          <a:p>
+            <a:r>
+              <a:rPr lang="en-US" dirty="0"/>
+              <a:t>The 2060 model assumes exogenous firm power capacity, and all unabated coal and gas are phased out by 2060.</a:t>
+            </a:r>
+          </a:p>
+          <a:p>
+            <a:r>
+              <a:rPr lang="en-US" dirty="0"/>
+              <a:t>But China now has over 10,000 GW of total coal generation capacity. </a:t>
+            </a:r>
+          </a:p>
+          <a:p>
+            <a:r>
+              <a:rPr lang="en-US" dirty="0"/>
+              <a:t>For the decadal snapshots, how should we adjust firm power capacity? </a:t>
             </a:r>
           </a:p>
         </p:txBody>
@@ -7640,7 +7682,7 @@
     </p:spTree>
     <p:extLst>
       <p:ext uri="{BB962C8B-B14F-4D97-AF65-F5344CB8AC3E}">
-        <p14:creationId xmlns:p14="http://schemas.microsoft.com/office/powerpoint/2010/main" val="977781073"/>
+        <p14:creationId xmlns:p14="http://schemas.microsoft.com/office/powerpoint/2010/main" val="972270817"/>
       </p:ext>
     </p:extLst>
   </p:cSld>
@@ -7672,104 +7714,6 @@
           <p:cNvPr id="2" name="Title 1">
             <a:extLst>
               <a:ext uri="{FF2B5EF4-FFF2-40B4-BE49-F238E27FC236}">
-                <a16:creationId xmlns:a16="http://schemas.microsoft.com/office/drawing/2014/main" id="{244C98A3-D7EE-4284-A54E-A30107CD566A}"/>
-              </a:ext>
-            </a:extLst>
-          </p:cNvPr>
-          <p:cNvSpPr>
-            <a:spLocks noGrp="1"/>
-          </p:cNvSpPr>
-          <p:nvPr>
-            <p:ph type="title"/>
-          </p:nvPr>
-        </p:nvSpPr>
-        <p:spPr/>
-        <p:txBody>
-          <a:bodyPr/>
-          <a:lstStyle/>
-          <a:p>
-            <a:r>
-              <a:rPr lang="en-US" dirty="0"/>
-              <a:t>Specifically…</a:t>
-            </a:r>
-          </a:p>
-        </p:txBody>
-      </p:sp>
-      <p:sp>
-        <p:nvSpPr>
-          <p:cNvPr id="3" name="Content Placeholder 2">
-            <a:extLst>
-              <a:ext uri="{FF2B5EF4-FFF2-40B4-BE49-F238E27FC236}">
-                <a16:creationId xmlns:a16="http://schemas.microsoft.com/office/drawing/2014/main" id="{DDBCCAB8-217C-4935-963D-F198DA29F06E}"/>
-              </a:ext>
-            </a:extLst>
-          </p:cNvPr>
-          <p:cNvSpPr>
-            <a:spLocks noGrp="1"/>
-          </p:cNvSpPr>
-          <p:nvPr>
-            <p:ph idx="1"/>
-          </p:nvPr>
-        </p:nvSpPr>
-        <p:spPr/>
-        <p:txBody>
-          <a:bodyPr/>
-          <a:lstStyle/>
-          <a:p>
-            <a:r>
-              <a:rPr lang="en-US" dirty="0"/>
-              <a:t>The 2060 model assumes exogenous firm power capacity, and all unabated coal and gas are phased out by 2060.</a:t>
-            </a:r>
-          </a:p>
-          <a:p>
-            <a:r>
-              <a:rPr lang="en-US" dirty="0"/>
-              <a:t>But China now has over 10,000 GW of total coal generation capacity. </a:t>
-            </a:r>
-          </a:p>
-          <a:p>
-            <a:r>
-              <a:rPr lang="en-US" dirty="0"/>
-              <a:t>For the decadal snapshots, how should we adjust firm power capacity? </a:t>
-            </a:r>
-          </a:p>
-        </p:txBody>
-      </p:sp>
-    </p:spTree>
-    <p:extLst>
-      <p:ext uri="{BB962C8B-B14F-4D97-AF65-F5344CB8AC3E}">
-        <p14:creationId xmlns:p14="http://schemas.microsoft.com/office/powerpoint/2010/main" val="972270817"/>
-      </p:ext>
-    </p:extLst>
-  </p:cSld>
-  <p:clrMapOvr>
-    <a:masterClrMapping/>
-  </p:clrMapOvr>
-</p:sld>
-</file>
-
-<file path=ppt/slides/slide26.xml><?xml version="1.0" encoding="utf-8"?>
-<p:sld xmlns:a="http://schemas.openxmlformats.org/drawingml/2006/main" xmlns:r="http://schemas.openxmlformats.org/officeDocument/2006/relationships" xmlns:p="http://schemas.openxmlformats.org/presentationml/2006/main">
-  <p:cSld>
-    <p:spTree>
-      <p:nvGrpSpPr>
-        <p:cNvPr id="1" name=""/>
-        <p:cNvGrpSpPr/>
-        <p:nvPr/>
-      </p:nvGrpSpPr>
-      <p:grpSpPr>
-        <a:xfrm>
-          <a:off x="0" y="0"/>
-          <a:ext cx="0" cy="0"/>
-          <a:chOff x="0" y="0"/>
-          <a:chExt cx="0" cy="0"/>
-        </a:xfrm>
-      </p:grpSpPr>
-      <p:sp>
-        <p:nvSpPr>
-          <p:cNvPr id="2" name="Title 1">
-            <a:extLst>
-              <a:ext uri="{FF2B5EF4-FFF2-40B4-BE49-F238E27FC236}">
                 <a16:creationId xmlns:a16="http://schemas.microsoft.com/office/drawing/2014/main" id="{0428D852-058E-40FB-ABD7-14C3084ECFBF}"/>
               </a:ext>
             </a:extLst>
@@ -7882,7 +7826,7 @@
 </p:sld>
 </file>
 
-<file path=ppt/slides/slide27.xml><?xml version="1.0" encoding="utf-8"?>
+<file path=ppt/slides/slide26.xml><?xml version="1.0" encoding="utf-8"?>
 <p:sld xmlns:a="http://schemas.openxmlformats.org/drawingml/2006/main" xmlns:r="http://schemas.openxmlformats.org/officeDocument/2006/relationships" xmlns:p="http://schemas.openxmlformats.org/presentationml/2006/main">
   <p:cSld>
     <p:spTree>
@@ -7976,7 +7920,7 @@
 </p:sld>
 </file>
 
-<file path=ppt/slides/slide28.xml><?xml version="1.0" encoding="utf-8"?>
+<file path=ppt/slides/slide27.xml><?xml version="1.0" encoding="utf-8"?>
 <p:sld xmlns:a="http://schemas.openxmlformats.org/drawingml/2006/main" xmlns:r="http://schemas.openxmlformats.org/officeDocument/2006/relationships" xmlns:p="http://schemas.openxmlformats.org/presentationml/2006/main">
   <p:cSld>
     <p:spTree>
@@ -8021,8 +7965,8 @@
           </a:p>
         </p:txBody>
       </p:sp>
-      <mc:AlternateContent xmlns:mc="http://schemas.openxmlformats.org/markup-compatibility/2006">
-        <mc:Choice xmlns:a14="http://schemas.microsoft.com/office/drawing/2010/main" Requires="a14">
+      <mc:AlternateContent xmlns:mc="http://schemas.openxmlformats.org/markup-compatibility/2006" xmlns:a14="http://schemas.microsoft.com/office/drawing/2010/main">
+        <mc:Choice Requires="a14">
           <p:sp>
             <p:nvSpPr>
               <p:cNvPr id="3" name="Content Placeholder 2">
@@ -8112,7 +8056,7 @@
             </p:txBody>
           </p:sp>
         </mc:Choice>
-        <mc:Fallback>
+        <mc:Fallback xmlns="">
           <p:sp>
             <p:nvSpPr>
               <p:cNvPr id="3" name="Content Placeholder 2">
@@ -8237,6 +8181,188 @@
 </p:sld>
 </file>
 
+<file path=ppt/slides/slide28.xml><?xml version="1.0" encoding="utf-8"?>
+<p:sld xmlns:a="http://schemas.openxmlformats.org/drawingml/2006/main" xmlns:r="http://schemas.openxmlformats.org/officeDocument/2006/relationships" xmlns:p="http://schemas.openxmlformats.org/presentationml/2006/main">
+  <p:cSld>
+    <p:spTree>
+      <p:nvGrpSpPr>
+        <p:cNvPr id="1" name=""/>
+        <p:cNvGrpSpPr/>
+        <p:nvPr/>
+      </p:nvGrpSpPr>
+      <p:grpSpPr>
+        <a:xfrm>
+          <a:off x="0" y="0"/>
+          <a:ext cx="0" cy="0"/>
+          <a:chOff x="0" y="0"/>
+          <a:chExt cx="0" cy="0"/>
+        </a:xfrm>
+      </p:grpSpPr>
+      <p:sp>
+        <p:nvSpPr>
+          <p:cNvPr id="2" name="Title 1">
+            <a:extLst>
+              <a:ext uri="{FF2B5EF4-FFF2-40B4-BE49-F238E27FC236}">
+                <a16:creationId xmlns:a16="http://schemas.microsoft.com/office/drawing/2014/main" id="{BCAF799B-091B-41F0-A901-588B99136F33}"/>
+              </a:ext>
+            </a:extLst>
+          </p:cNvPr>
+          <p:cNvSpPr>
+            <a:spLocks noGrp="1"/>
+          </p:cNvSpPr>
+          <p:nvPr>
+            <p:ph type="title"/>
+          </p:nvPr>
+        </p:nvSpPr>
+        <p:spPr/>
+        <p:txBody>
+          <a:bodyPr/>
+          <a:lstStyle/>
+          <a:p>
+            <a:r>
+              <a:rPr lang="en-US" dirty="0"/>
+              <a:t>Early Retirement </a:t>
+            </a:r>
+          </a:p>
+        </p:txBody>
+      </p:sp>
+      <p:pic>
+        <p:nvPicPr>
+          <p:cNvPr id="5" name="Content Placeholder 4">
+            <a:extLst>
+              <a:ext uri="{FF2B5EF4-FFF2-40B4-BE49-F238E27FC236}">
+                <a16:creationId xmlns:a16="http://schemas.microsoft.com/office/drawing/2014/main" id="{761A3770-6B76-4F47-A5C8-60F9A6D1CE99}"/>
+              </a:ext>
+            </a:extLst>
+          </p:cNvPr>
+          <p:cNvPicPr>
+            <a:picLocks noGrp="1" noChangeAspect="1"/>
+          </p:cNvPicPr>
+          <p:nvPr>
+            <p:ph idx="1"/>
+          </p:nvPr>
+        </p:nvPicPr>
+        <p:blipFill rotWithShape="1">
+          <a:blip r:embed="rId2"/>
+          <a:srcRect l="5131" r="5437"/>
+          <a:stretch/>
+        </p:blipFill>
+        <p:spPr>
+          <a:xfrm>
+            <a:off x="4528868" y="1449148"/>
+            <a:ext cx="7559615" cy="4351338"/>
+          </a:xfrm>
+        </p:spPr>
+      </p:pic>
+      <p:sp>
+        <p:nvSpPr>
+          <p:cNvPr id="7" name="TextBox 6">
+            <a:extLst>
+              <a:ext uri="{FF2B5EF4-FFF2-40B4-BE49-F238E27FC236}">
+                <a16:creationId xmlns:a16="http://schemas.microsoft.com/office/drawing/2014/main" id="{2154020D-197E-4F1F-A8F8-4E1F0433270F}"/>
+              </a:ext>
+            </a:extLst>
+          </p:cNvPr>
+          <p:cNvSpPr txBox="1"/>
+          <p:nvPr/>
+        </p:nvSpPr>
+        <p:spPr>
+          <a:xfrm>
+            <a:off x="603849" y="1595887"/>
+            <a:ext cx="3752491" cy="4062651"/>
+          </a:xfrm>
+          <a:prstGeom prst="rect">
+            <a:avLst/>
+          </a:prstGeom>
+          <a:noFill/>
+        </p:spPr>
+        <p:txBody>
+          <a:bodyPr wrap="square" rtlCol="0">
+            <a:spAutoFit/>
+          </a:bodyPr>
+          <a:lstStyle/>
+          <a:p>
+            <a:pPr marL="285750" indent="-285750">
+              <a:buFont typeface="Arial" panose="020B0604020202020204" pitchFamily="34" charset="0"/>
+              <a:buChar char="•"/>
+            </a:pPr>
+            <a:r>
+              <a:rPr lang="en-US" sz="2400" dirty="0"/>
+              <a:t>Created combined retirement score</a:t>
+            </a:r>
+          </a:p>
+          <a:p>
+            <a:pPr marL="285750" indent="-285750">
+              <a:buFont typeface="Arial" panose="020B0604020202020204" pitchFamily="34" charset="0"/>
+              <a:buChar char="•"/>
+            </a:pPr>
+            <a:r>
+              <a:rPr lang="en-US" sz="2400" dirty="0"/>
+              <a:t>Consider three aspects when deciding which plants should retire first</a:t>
+            </a:r>
+          </a:p>
+          <a:p>
+            <a:pPr marL="742950" lvl="1" indent="-285750">
+              <a:buFont typeface="Arial" panose="020B0604020202020204" pitchFamily="34" charset="0"/>
+              <a:buChar char="•"/>
+            </a:pPr>
+            <a:r>
+              <a:rPr lang="en-US" sz="2400" dirty="0"/>
+              <a:t>Technical attributes</a:t>
+            </a:r>
+          </a:p>
+          <a:p>
+            <a:pPr marL="742950" lvl="1" indent="-285750">
+              <a:buFont typeface="Arial" panose="020B0604020202020204" pitchFamily="34" charset="0"/>
+              <a:buChar char="•"/>
+            </a:pPr>
+            <a:r>
+              <a:rPr lang="en-US" sz="2400" dirty="0"/>
+              <a:t>Profitability </a:t>
+            </a:r>
+          </a:p>
+          <a:p>
+            <a:pPr marL="742950" lvl="1" indent="-285750">
+              <a:buFont typeface="Arial" panose="020B0604020202020204" pitchFamily="34" charset="0"/>
+              <a:buChar char="•"/>
+            </a:pPr>
+            <a:r>
+              <a:rPr lang="en-US" sz="2400" dirty="0"/>
+              <a:t>Environmental impacts</a:t>
+            </a:r>
+          </a:p>
+          <a:p>
+            <a:pPr marL="285750" indent="-285750">
+              <a:buFont typeface="Arial" panose="020B0604020202020204" pitchFamily="34" charset="0"/>
+              <a:buChar char="•"/>
+            </a:pPr>
+            <a:r>
+              <a:rPr lang="en-US" sz="2400" dirty="0"/>
+              <a:t>Score for each GEM plants</a:t>
+            </a:r>
+          </a:p>
+          <a:p>
+            <a:pPr marL="285750" indent="-285750">
+              <a:buFont typeface="Arial" panose="020B0604020202020204" pitchFamily="34" charset="0"/>
+              <a:buChar char="•"/>
+            </a:pPr>
+            <a:endParaRPr lang="en-US" dirty="0"/>
+          </a:p>
+        </p:txBody>
+      </p:sp>
+    </p:spTree>
+    <p:extLst>
+      <p:ext uri="{BB962C8B-B14F-4D97-AF65-F5344CB8AC3E}">
+        <p14:creationId xmlns:p14="http://schemas.microsoft.com/office/powerpoint/2010/main" val="4211845875"/>
+      </p:ext>
+    </p:extLst>
+  </p:cSld>
+  <p:clrMapOvr>
+    <a:masterClrMapping/>
+  </p:clrMapOvr>
+</p:sld>
+</file>
+
 <file path=ppt/slides/slide29.xml><?xml version="1.0" encoding="utf-8"?>
 <p:sld xmlns:a="http://schemas.openxmlformats.org/drawingml/2006/main" xmlns:r="http://schemas.openxmlformats.org/officeDocument/2006/relationships" xmlns:p="http://schemas.openxmlformats.org/presentationml/2006/main">
   <p:cSld>
@@ -8259,7 +8385,7 @@
           <p:cNvPr id="2" name="Title 1">
             <a:extLst>
               <a:ext uri="{FF2B5EF4-FFF2-40B4-BE49-F238E27FC236}">
-                <a16:creationId xmlns:a16="http://schemas.microsoft.com/office/drawing/2014/main" id="{BCAF799B-091B-41F0-A901-588B99136F33}"/>
+                <a16:creationId xmlns:a16="http://schemas.microsoft.com/office/drawing/2014/main" id="{7C353408-4510-4181-8745-D7B514A6AAA3}"/>
               </a:ext>
             </a:extLst>
           </p:cNvPr>
@@ -8277,45 +8403,76 @@
           <a:p>
             <a:r>
               <a:rPr lang="en-US" dirty="0"/>
-              <a:t>Early Retirement </a:t>
+              <a:t>Evaluation details</a:t>
             </a:r>
           </a:p>
         </p:txBody>
       </p:sp>
       <p:pic>
         <p:nvPicPr>
-          <p:cNvPr id="5" name="Content Placeholder 4">
-            <a:extLst>
-              <a:ext uri="{FF2B5EF4-FFF2-40B4-BE49-F238E27FC236}">
-                <a16:creationId xmlns:a16="http://schemas.microsoft.com/office/drawing/2014/main" id="{761A3770-6B76-4F47-A5C8-60F9A6D1CE99}"/>
+          <p:cNvPr id="5" name="Picture 4">
+            <a:extLst>
+              <a:ext uri="{FF2B5EF4-FFF2-40B4-BE49-F238E27FC236}">
+                <a16:creationId xmlns:a16="http://schemas.microsoft.com/office/drawing/2014/main" id="{5334971D-228B-4D02-88AF-AA1CBC8D69B9}"/>
               </a:ext>
             </a:extLst>
           </p:cNvPr>
           <p:cNvPicPr>
-            <a:picLocks noGrp="1" noChangeAspect="1"/>
+            <a:picLocks noChangeAspect="1"/>
           </p:cNvPicPr>
-          <p:nvPr>
-            <p:ph idx="1"/>
-          </p:nvPr>
+          <p:nvPr/>
         </p:nvPicPr>
         <p:blipFill rotWithShape="1">
           <a:blip r:embed="rId2"/>
-          <a:srcRect l="5131" r="5437"/>
+          <a:srcRect l="16240" r="6434"/>
           <a:stretch/>
         </p:blipFill>
         <p:spPr>
           <a:xfrm>
-            <a:off x="4528868" y="1449148"/>
-            <a:ext cx="7559615" cy="4351338"/>
+            <a:off x="552090" y="1690688"/>
+            <a:ext cx="6150634" cy="4420523"/>
           </a:xfrm>
+          <a:prstGeom prst="rect">
+            <a:avLst/>
+          </a:prstGeom>
         </p:spPr>
       </p:pic>
-      <p:sp>
-        <p:nvSpPr>
-          <p:cNvPr id="7" name="TextBox 6">
-            <a:extLst>
-              <a:ext uri="{FF2B5EF4-FFF2-40B4-BE49-F238E27FC236}">
-                <a16:creationId xmlns:a16="http://schemas.microsoft.com/office/drawing/2014/main" id="{2154020D-197E-4F1F-A8F8-4E1F0433270F}"/>
+      <p:pic>
+        <p:nvPicPr>
+          <p:cNvPr id="7" name="Picture 6">
+            <a:extLst>
+              <a:ext uri="{FF2B5EF4-FFF2-40B4-BE49-F238E27FC236}">
+                <a16:creationId xmlns:a16="http://schemas.microsoft.com/office/drawing/2014/main" id="{020925D4-93AC-4710-9CAA-EC9C00B2BE8B}"/>
+              </a:ext>
+            </a:extLst>
+          </p:cNvPr>
+          <p:cNvPicPr>
+            <a:picLocks noChangeAspect="1"/>
+          </p:cNvPicPr>
+          <p:nvPr/>
+        </p:nvPicPr>
+        <p:blipFill>
+          <a:blip r:embed="rId3"/>
+          <a:stretch>
+            <a:fillRect/>
+          </a:stretch>
+        </p:blipFill>
+        <p:spPr>
+          <a:xfrm>
+            <a:off x="6988834" y="1576850"/>
+            <a:ext cx="5012886" cy="4648200"/>
+          </a:xfrm>
+          <a:prstGeom prst="rect">
+            <a:avLst/>
+          </a:prstGeom>
+        </p:spPr>
+      </p:pic>
+      <p:sp>
+        <p:nvSpPr>
+          <p:cNvPr id="8" name="TextBox 7">
+            <a:extLst>
+              <a:ext uri="{FF2B5EF4-FFF2-40B4-BE49-F238E27FC236}">
+                <a16:creationId xmlns:a16="http://schemas.microsoft.com/office/drawing/2014/main" id="{9C3C51E2-075B-4AB0-9311-EDA1107FD659}"/>
               </a:ext>
             </a:extLst>
           </p:cNvPr>
@@ -8324,8 +8481,8 @@
         </p:nvSpPr>
         <p:spPr>
           <a:xfrm>
-            <a:off x="603849" y="1595887"/>
-            <a:ext cx="3752491" cy="4062651"/>
+            <a:off x="10353136" y="6492875"/>
+            <a:ext cx="1764883" cy="369332"/>
           </a:xfrm>
           <a:prstGeom prst="rect">
             <a:avLst/>
@@ -8338,78 +8495,21 @@
           </a:bodyPr>
           <a:lstStyle/>
           <a:p>
-            <a:pPr marL="285750" indent="-285750">
-              <a:buFont typeface="Arial" panose="020B0604020202020204" pitchFamily="34" charset="0"/>
-              <a:buChar char="•"/>
-            </a:pPr>
-            <a:r>
-              <a:rPr lang="en-US" sz="2400" dirty="0"/>
-              <a:t>Created combined retirement score</a:t>
-            </a:r>
-          </a:p>
-          <a:p>
-            <a:pPr marL="285750" indent="-285750">
-              <a:buFont typeface="Arial" panose="020B0604020202020204" pitchFamily="34" charset="0"/>
-              <a:buChar char="•"/>
-            </a:pPr>
-            <a:r>
-              <a:rPr lang="en-US" sz="2400" dirty="0"/>
-              <a:t>Consider three aspects when deciding which plants should retire first</a:t>
-            </a:r>
-          </a:p>
-          <a:p>
-            <a:pPr marL="742950" lvl="1" indent="-285750">
-              <a:buFont typeface="Arial" panose="020B0604020202020204" pitchFamily="34" charset="0"/>
-              <a:buChar char="•"/>
-            </a:pPr>
-            <a:r>
-              <a:rPr lang="en-US" sz="2400" dirty="0"/>
-              <a:t>Technical attributes</a:t>
-            </a:r>
-          </a:p>
-          <a:p>
-            <a:pPr marL="742950" lvl="1" indent="-285750">
-              <a:buFont typeface="Arial" panose="020B0604020202020204" pitchFamily="34" charset="0"/>
-              <a:buChar char="•"/>
-            </a:pPr>
-            <a:r>
-              <a:rPr lang="en-US" sz="2400" dirty="0"/>
-              <a:t>Profitability </a:t>
-            </a:r>
-          </a:p>
-          <a:p>
-            <a:pPr marL="742950" lvl="1" indent="-285750">
-              <a:buFont typeface="Arial" panose="020B0604020202020204" pitchFamily="34" charset="0"/>
-              <a:buChar char="•"/>
-            </a:pPr>
-            <a:r>
-              <a:rPr lang="en-US" sz="2400" dirty="0"/>
-              <a:t>Environmental impacts</a:t>
-            </a:r>
-          </a:p>
-          <a:p>
-            <a:pPr marL="285750" indent="-285750">
-              <a:buFont typeface="Arial" panose="020B0604020202020204" pitchFamily="34" charset="0"/>
-              <a:buChar char="•"/>
-            </a:pPr>
-            <a:r>
-              <a:rPr lang="en-US" sz="2400" dirty="0"/>
-              <a:t>Score for each GEM plants</a:t>
-            </a:r>
-          </a:p>
-          <a:p>
-            <a:pPr marL="285750" indent="-285750">
-              <a:buFont typeface="Arial" panose="020B0604020202020204" pitchFamily="34" charset="0"/>
-              <a:buChar char="•"/>
-            </a:pPr>
-            <a:endParaRPr lang="en-US" dirty="0"/>
+            <a:r>
+              <a:rPr lang="en-US" sz="1600" dirty="0"/>
+              <a:t>Credits</a:t>
+            </a:r>
+            <a:r>
+              <a:rPr lang="en-US" dirty="0"/>
+              <a:t>: Cui et al. </a:t>
+            </a:r>
           </a:p>
         </p:txBody>
       </p:sp>
     </p:spTree>
     <p:extLst>
       <p:ext uri="{BB962C8B-B14F-4D97-AF65-F5344CB8AC3E}">
-        <p14:creationId xmlns:p14="http://schemas.microsoft.com/office/powerpoint/2010/main" val="4211845875"/>
+        <p14:creationId xmlns:p14="http://schemas.microsoft.com/office/powerpoint/2010/main" val="1226786722"/>
       </p:ext>
     </p:extLst>
   </p:cSld>
@@ -8548,162 +8648,6 @@
           <p:cNvPr id="2" name="Title 1">
             <a:extLst>
               <a:ext uri="{FF2B5EF4-FFF2-40B4-BE49-F238E27FC236}">
-                <a16:creationId xmlns:a16="http://schemas.microsoft.com/office/drawing/2014/main" id="{7C353408-4510-4181-8745-D7B514A6AAA3}"/>
-              </a:ext>
-            </a:extLst>
-          </p:cNvPr>
-          <p:cNvSpPr>
-            <a:spLocks noGrp="1"/>
-          </p:cNvSpPr>
-          <p:nvPr>
-            <p:ph type="title"/>
-          </p:nvPr>
-        </p:nvSpPr>
-        <p:spPr/>
-        <p:txBody>
-          <a:bodyPr/>
-          <a:lstStyle/>
-          <a:p>
-            <a:r>
-              <a:rPr lang="en-US" dirty="0"/>
-              <a:t>Evaluation details</a:t>
-            </a:r>
-          </a:p>
-        </p:txBody>
-      </p:sp>
-      <p:pic>
-        <p:nvPicPr>
-          <p:cNvPr id="5" name="Picture 4">
-            <a:extLst>
-              <a:ext uri="{FF2B5EF4-FFF2-40B4-BE49-F238E27FC236}">
-                <a16:creationId xmlns:a16="http://schemas.microsoft.com/office/drawing/2014/main" id="{5334971D-228B-4D02-88AF-AA1CBC8D69B9}"/>
-              </a:ext>
-            </a:extLst>
-          </p:cNvPr>
-          <p:cNvPicPr>
-            <a:picLocks noChangeAspect="1"/>
-          </p:cNvPicPr>
-          <p:nvPr/>
-        </p:nvPicPr>
-        <p:blipFill rotWithShape="1">
-          <a:blip r:embed="rId2"/>
-          <a:srcRect l="16240" r="6434"/>
-          <a:stretch/>
-        </p:blipFill>
-        <p:spPr>
-          <a:xfrm>
-            <a:off x="552090" y="1690688"/>
-            <a:ext cx="6150634" cy="4420523"/>
-          </a:xfrm>
-          <a:prstGeom prst="rect">
-            <a:avLst/>
-          </a:prstGeom>
-        </p:spPr>
-      </p:pic>
-      <p:pic>
-        <p:nvPicPr>
-          <p:cNvPr id="7" name="Picture 6">
-            <a:extLst>
-              <a:ext uri="{FF2B5EF4-FFF2-40B4-BE49-F238E27FC236}">
-                <a16:creationId xmlns:a16="http://schemas.microsoft.com/office/drawing/2014/main" id="{020925D4-93AC-4710-9CAA-EC9C00B2BE8B}"/>
-              </a:ext>
-            </a:extLst>
-          </p:cNvPr>
-          <p:cNvPicPr>
-            <a:picLocks noChangeAspect="1"/>
-          </p:cNvPicPr>
-          <p:nvPr/>
-        </p:nvPicPr>
-        <p:blipFill>
-          <a:blip r:embed="rId3"/>
-          <a:stretch>
-            <a:fillRect/>
-          </a:stretch>
-        </p:blipFill>
-        <p:spPr>
-          <a:xfrm>
-            <a:off x="6988834" y="1576850"/>
-            <a:ext cx="5012886" cy="4648200"/>
-          </a:xfrm>
-          <a:prstGeom prst="rect">
-            <a:avLst/>
-          </a:prstGeom>
-        </p:spPr>
-      </p:pic>
-      <p:sp>
-        <p:nvSpPr>
-          <p:cNvPr id="8" name="TextBox 7">
-            <a:extLst>
-              <a:ext uri="{FF2B5EF4-FFF2-40B4-BE49-F238E27FC236}">
-                <a16:creationId xmlns:a16="http://schemas.microsoft.com/office/drawing/2014/main" id="{9C3C51E2-075B-4AB0-9311-EDA1107FD659}"/>
-              </a:ext>
-            </a:extLst>
-          </p:cNvPr>
-          <p:cNvSpPr txBox="1"/>
-          <p:nvPr/>
-        </p:nvSpPr>
-        <p:spPr>
-          <a:xfrm>
-            <a:off x="10353136" y="6492875"/>
-            <a:ext cx="1764883" cy="369332"/>
-          </a:xfrm>
-          <a:prstGeom prst="rect">
-            <a:avLst/>
-          </a:prstGeom>
-          <a:noFill/>
-        </p:spPr>
-        <p:txBody>
-          <a:bodyPr wrap="square" rtlCol="0">
-            <a:spAutoFit/>
-          </a:bodyPr>
-          <a:lstStyle/>
-          <a:p>
-            <a:r>
-              <a:rPr lang="en-US" sz="1600" dirty="0"/>
-              <a:t>Credits</a:t>
-            </a:r>
-            <a:r>
-              <a:rPr lang="en-US" dirty="0"/>
-              <a:t>: Cui et al. </a:t>
-            </a:r>
-          </a:p>
-        </p:txBody>
-      </p:sp>
-    </p:spTree>
-    <p:extLst>
-      <p:ext uri="{BB962C8B-B14F-4D97-AF65-F5344CB8AC3E}">
-        <p14:creationId xmlns:p14="http://schemas.microsoft.com/office/powerpoint/2010/main" val="1226786722"/>
-      </p:ext>
-    </p:extLst>
-  </p:cSld>
-  <p:clrMapOvr>
-    <a:masterClrMapping/>
-  </p:clrMapOvr>
-</p:sld>
-</file>
-
-<file path=ppt/slides/slide31.xml><?xml version="1.0" encoding="utf-8"?>
-<p:sld xmlns:a="http://schemas.openxmlformats.org/drawingml/2006/main" xmlns:r="http://schemas.openxmlformats.org/officeDocument/2006/relationships" xmlns:p="http://schemas.openxmlformats.org/presentationml/2006/main">
-  <p:cSld>
-    <p:spTree>
-      <p:nvGrpSpPr>
-        <p:cNvPr id="1" name=""/>
-        <p:cNvGrpSpPr/>
-        <p:nvPr/>
-      </p:nvGrpSpPr>
-      <p:grpSpPr>
-        <a:xfrm>
-          <a:off x="0" y="0"/>
-          <a:ext cx="0" cy="0"/>
-          <a:chOff x="0" y="0"/>
-          <a:chExt cx="0" cy="0"/>
-        </a:xfrm>
-      </p:grpSpPr>
-      <p:sp>
-        <p:nvSpPr>
-          <p:cNvPr id="2" name="Title 1">
-            <a:extLst>
-              <a:ext uri="{FF2B5EF4-FFF2-40B4-BE49-F238E27FC236}">
                 <a16:creationId xmlns:a16="http://schemas.microsoft.com/office/drawing/2014/main" id="{09BE1A1B-7226-44FC-85B0-17501A8427C1}"/>
               </a:ext>
             </a:extLst>
@@ -8782,7 +8726,7 @@
 </p:sld>
 </file>
 
-<file path=ppt/slides/slide32.xml><?xml version="1.0" encoding="utf-8"?>
+<file path=ppt/slides/slide31.xml><?xml version="1.0" encoding="utf-8"?>
 <p:sld xmlns:a="http://schemas.openxmlformats.org/drawingml/2006/main" xmlns:r="http://schemas.openxmlformats.org/officeDocument/2006/relationships" xmlns:p="http://schemas.openxmlformats.org/presentationml/2006/main">
   <p:cSld>
     <p:spTree>
@@ -9146,10 +9090,10 @@
       </p:grpSpPr>
       <p:pic>
         <p:nvPicPr>
-          <p:cNvPr id="9" name="Picture 8">
-            <a:extLst>
-              <a:ext uri="{FF2B5EF4-FFF2-40B4-BE49-F238E27FC236}">
-                <a16:creationId xmlns:a16="http://schemas.microsoft.com/office/drawing/2014/main" id="{175E815A-5112-4E02-91AA-B3DE703A1CDB}"/>
+          <p:cNvPr id="3" name="Picture 2" descr="Diagram&#10;&#10;Description automatically generated">
+            <a:extLst>
+              <a:ext uri="{FF2B5EF4-FFF2-40B4-BE49-F238E27FC236}">
+                <a16:creationId xmlns:a16="http://schemas.microsoft.com/office/drawing/2014/main" id="{D662A3B6-951C-5E11-F17F-E7FCB8E58A1A}"/>
               </a:ext>
             </a:extLst>
           </p:cNvPr>
@@ -9159,14 +9103,20 @@
           <p:nvPr/>
         </p:nvPicPr>
         <p:blipFill>
-          <a:blip r:embed="rId2"/>
+          <a:blip r:embed="rId2">
+            <a:extLst>
+              <a:ext uri="{28A0092B-C50C-407E-A947-70E740481C1C}">
+                <a14:useLocalDpi xmlns:a14="http://schemas.microsoft.com/office/drawing/2010/main" val="0"/>
+              </a:ext>
+            </a:extLst>
+          </a:blip>
           <a:stretch>
             <a:fillRect/>
           </a:stretch>
         </p:blipFill>
         <p:spPr>
           <a:xfrm>
-            <a:off x="2847975" y="871537"/>
+            <a:off x="2994624" y="871537"/>
             <a:ext cx="6496050" cy="5114925"/>
           </a:xfrm>
           <a:prstGeom prst="rect">
@@ -9209,7 +9159,7 @@
           <p:cNvPr id="2" name="Title 1">
             <a:extLst>
               <a:ext uri="{FF2B5EF4-FFF2-40B4-BE49-F238E27FC236}">
-                <a16:creationId xmlns:a16="http://schemas.microsoft.com/office/drawing/2014/main" id="{1C3AC3CD-505B-4AE0-9395-4D2512AA4195}"/>
+                <a16:creationId xmlns:a16="http://schemas.microsoft.com/office/drawing/2014/main" id="{86B43AAC-7BEB-4F6C-869B-5076079FDA9D}"/>
               </a:ext>
             </a:extLst>
           </p:cNvPr>
@@ -9227,7 +9177,7 @@
           <a:p>
             <a:r>
               <a:rPr lang="en-US" dirty="0"/>
-              <a:t>Why use optimization models in general?</a:t>
+              <a:t>Why use optimization models on power system planning?</a:t>
             </a:r>
           </a:p>
         </p:txBody>
@@ -9237,7 +9187,7 @@
           <p:cNvPr id="3" name="Content Placeholder 2">
             <a:extLst>
               <a:ext uri="{FF2B5EF4-FFF2-40B4-BE49-F238E27FC236}">
-                <a16:creationId xmlns:a16="http://schemas.microsoft.com/office/drawing/2014/main" id="{53D161AB-F339-4DB4-BBBE-5A8AD43C0CA0}"/>
+                <a16:creationId xmlns:a16="http://schemas.microsoft.com/office/drawing/2014/main" id="{AD5C39C0-0C1E-43E4-BFB8-350A607F3E80}"/>
               </a:ext>
             </a:extLst>
           </p:cNvPr>
@@ -9255,57 +9205,33 @@
           <a:p>
             <a:r>
               <a:rPr lang="en-US" dirty="0"/>
-              <a:t>“All models are wrong but some are useful” </a:t>
+              <a:t>Optimization is widely used in operations of power system (e.g. electricity dispatch), but here I am focusing on planning alone </a:t>
             </a:r>
           </a:p>
           <a:p>
             <a:r>
               <a:rPr lang="en-US" dirty="0"/>
-              <a:t>Modeling is not meant to capture </a:t>
-            </a:r>
-            <a:r>
-              <a:rPr lang="en-US" i="1" dirty="0"/>
-              <a:t>every single </a:t>
-            </a:r>
+              <a:t>Increasingly, pressure from climate change and emission targets – system-level planning is critical </a:t>
+            </a:r>
+          </a:p>
+          <a:p>
             <a:r>
               <a:rPr lang="en-US" dirty="0"/>
-              <a:t>details of the real world</a:t>
+              <a:t>Provide a concrete scaffold for policymakers</a:t>
             </a:r>
           </a:p>
           <a:p>
             <a:r>
               <a:rPr lang="en-US" dirty="0"/>
-              <a:t>Analogy: dimensionality reduction</a:t>
-            </a:r>
-            <a:endParaRPr lang="en-US" i="1" dirty="0"/>
-          </a:p>
-          <a:p>
-            <a:r>
-              <a:rPr lang="en-US" dirty="0"/>
-              <a:t>Reduce the real-world complexity; highlight selected aspects of the reality and study their relations</a:t>
-            </a:r>
-          </a:p>
-          <a:p>
-            <a:r>
-              <a:rPr lang="en-US" dirty="0"/>
-              <a:t>Make explicit the assumptions and how the assumptions will impact the result. </a:t>
-            </a:r>
-          </a:p>
-          <a:p>
-            <a:endParaRPr lang="en-US" dirty="0"/>
-          </a:p>
-          <a:p>
-            <a:pPr marL="0" indent="0">
-              <a:buNone/>
-            </a:pPr>
-            <a:endParaRPr lang="en-US" dirty="0"/>
+              <a:t>Anticipate potential constraints and challenges</a:t>
+            </a:r>
           </a:p>
         </p:txBody>
       </p:sp>
     </p:spTree>
     <p:extLst>
       <p:ext uri="{BB962C8B-B14F-4D97-AF65-F5344CB8AC3E}">
-        <p14:creationId xmlns:p14="http://schemas.microsoft.com/office/powerpoint/2010/main" val="991824419"/>
+        <p14:creationId xmlns:p14="http://schemas.microsoft.com/office/powerpoint/2010/main" val="636357167"/>
       </p:ext>
     </p:extLst>
   </p:cSld>
@@ -9337,7 +9263,7 @@
           <p:cNvPr id="2" name="Title 1">
             <a:extLst>
               <a:ext uri="{FF2B5EF4-FFF2-40B4-BE49-F238E27FC236}">
-                <a16:creationId xmlns:a16="http://schemas.microsoft.com/office/drawing/2014/main" id="{86B43AAC-7BEB-4F6C-869B-5076079FDA9D}"/>
+                <a16:creationId xmlns:a16="http://schemas.microsoft.com/office/drawing/2014/main" id="{409DAABC-5677-450E-9635-17E590C22F58}"/>
               </a:ext>
             </a:extLst>
           </p:cNvPr>
@@ -9350,66 +9276,47 @@
         </p:nvSpPr>
         <p:spPr/>
         <p:txBody>
+          <a:bodyPr>
+            <a:normAutofit/>
+          </a:bodyPr>
+          <a:lstStyle/>
+          <a:p>
+            <a:r>
+              <a:rPr lang="en-US" dirty="0"/>
+              <a:t>Original paper: China’s renewable energy pathways toward carbon neutrality </a:t>
+            </a:r>
+          </a:p>
+        </p:txBody>
+      </p:sp>
+      <p:sp>
+        <p:nvSpPr>
+          <p:cNvPr id="3" name="Text Placeholder 2">
+            <a:extLst>
+              <a:ext uri="{FF2B5EF4-FFF2-40B4-BE49-F238E27FC236}">
+                <a16:creationId xmlns:a16="http://schemas.microsoft.com/office/drawing/2014/main" id="{5907B018-F5C7-4D08-9750-D732A1317F68}"/>
+              </a:ext>
+            </a:extLst>
+          </p:cNvPr>
+          <p:cNvSpPr>
+            <a:spLocks noGrp="1"/>
+          </p:cNvSpPr>
+          <p:nvPr>
+            <p:ph type="body" idx="1"/>
+          </p:nvPr>
+        </p:nvSpPr>
+        <p:spPr/>
+        <p:txBody>
           <a:bodyPr/>
           <a:lstStyle/>
           <a:p>
-            <a:r>
-              <a:rPr lang="en-US" dirty="0"/>
-              <a:t>Why use optimization models on power system planning?</a:t>
-            </a:r>
-          </a:p>
-        </p:txBody>
-      </p:sp>
-      <p:sp>
-        <p:nvSpPr>
-          <p:cNvPr id="3" name="Content Placeholder 2">
-            <a:extLst>
-              <a:ext uri="{FF2B5EF4-FFF2-40B4-BE49-F238E27FC236}">
-                <a16:creationId xmlns:a16="http://schemas.microsoft.com/office/drawing/2014/main" id="{AD5C39C0-0C1E-43E4-BFB8-350A607F3E80}"/>
-              </a:ext>
-            </a:extLst>
-          </p:cNvPr>
-          <p:cNvSpPr>
-            <a:spLocks noGrp="1"/>
-          </p:cNvSpPr>
-          <p:nvPr>
-            <p:ph idx="1"/>
-          </p:nvPr>
-        </p:nvSpPr>
-        <p:spPr/>
-        <p:txBody>
-          <a:bodyPr/>
-          <a:lstStyle/>
-          <a:p>
-            <a:r>
-              <a:rPr lang="en-US" dirty="0"/>
-              <a:t>Optimization is widely used in operations of power system (e.g. electricity dispatch), but here I am focusing on planning alone </a:t>
-            </a:r>
-          </a:p>
-          <a:p>
-            <a:r>
-              <a:rPr lang="en-US" dirty="0"/>
-              <a:t>Increasingly, pressure from climate change and emission targets – system-level planning is critical </a:t>
-            </a:r>
-          </a:p>
-          <a:p>
-            <a:r>
-              <a:rPr lang="en-US" dirty="0"/>
-              <a:t>Provide a concrete scaffold for policymakers</a:t>
-            </a:r>
-          </a:p>
-          <a:p>
-            <a:r>
-              <a:rPr lang="en-US" dirty="0"/>
-              <a:t>Anticipate potential constraints and challenges</a:t>
-            </a:r>
+            <a:endParaRPr lang="en-US" dirty="0"/>
           </a:p>
         </p:txBody>
       </p:sp>
     </p:spTree>
     <p:extLst>
       <p:ext uri="{BB962C8B-B14F-4D97-AF65-F5344CB8AC3E}">
-        <p14:creationId xmlns:p14="http://schemas.microsoft.com/office/powerpoint/2010/main" val="636357167"/>
+        <p14:creationId xmlns:p14="http://schemas.microsoft.com/office/powerpoint/2010/main" val="439058604"/>
       </p:ext>
     </p:extLst>
   </p:cSld>
@@ -9436,65 +9343,40 @@
           <a:chExt cx="0" cy="0"/>
         </a:xfrm>
       </p:grpSpPr>
-      <p:sp>
-        <p:nvSpPr>
-          <p:cNvPr id="2" name="Title 1">
-            <a:extLst>
-              <a:ext uri="{FF2B5EF4-FFF2-40B4-BE49-F238E27FC236}">
-                <a16:creationId xmlns:a16="http://schemas.microsoft.com/office/drawing/2014/main" id="{409DAABC-5677-450E-9635-17E590C22F58}"/>
-              </a:ext>
-            </a:extLst>
-          </p:cNvPr>
-          <p:cNvSpPr>
-            <a:spLocks noGrp="1"/>
-          </p:cNvSpPr>
-          <p:nvPr>
-            <p:ph type="title"/>
-          </p:nvPr>
-        </p:nvSpPr>
-        <p:spPr/>
-        <p:txBody>
-          <a:bodyPr>
-            <a:normAutofit/>
-          </a:bodyPr>
-          <a:lstStyle/>
-          <a:p>
-            <a:r>
-              <a:rPr lang="en-US" dirty="0"/>
-              <a:t>Original paper: China’s renewable energy pathways toward carbon neutrality </a:t>
-            </a:r>
-          </a:p>
-        </p:txBody>
-      </p:sp>
-      <p:sp>
-        <p:nvSpPr>
-          <p:cNvPr id="3" name="Text Placeholder 2">
-            <a:extLst>
-              <a:ext uri="{FF2B5EF4-FFF2-40B4-BE49-F238E27FC236}">
-                <a16:creationId xmlns:a16="http://schemas.microsoft.com/office/drawing/2014/main" id="{5907B018-F5C7-4D08-9750-D732A1317F68}"/>
-              </a:ext>
-            </a:extLst>
-          </p:cNvPr>
-          <p:cNvSpPr>
-            <a:spLocks noGrp="1"/>
-          </p:cNvSpPr>
-          <p:nvPr>
-            <p:ph type="body" idx="1"/>
-          </p:nvPr>
-        </p:nvSpPr>
-        <p:spPr/>
-        <p:txBody>
-          <a:bodyPr/>
-          <a:lstStyle/>
-          <a:p>
-            <a:endParaRPr lang="en-US" dirty="0"/>
-          </a:p>
-        </p:txBody>
-      </p:sp>
+      <p:pic>
+        <p:nvPicPr>
+          <p:cNvPr id="3" name="Picture 2">
+            <a:extLst>
+              <a:ext uri="{FF2B5EF4-FFF2-40B4-BE49-F238E27FC236}">
+                <a16:creationId xmlns:a16="http://schemas.microsoft.com/office/drawing/2014/main" id="{43B71F01-3A43-4B3E-BBE0-E6C8FED153E9}"/>
+              </a:ext>
+            </a:extLst>
+          </p:cNvPr>
+          <p:cNvPicPr>
+            <a:picLocks noChangeAspect="1"/>
+          </p:cNvPicPr>
+          <p:nvPr/>
+        </p:nvPicPr>
+        <p:blipFill>
+          <a:blip r:embed="rId2"/>
+          <a:stretch>
+            <a:fillRect/>
+          </a:stretch>
+        </p:blipFill>
+        <p:spPr>
+          <a:xfrm>
+            <a:off x="1404283" y="1114102"/>
+            <a:ext cx="9383434" cy="4629796"/>
+          </a:xfrm>
+          <a:prstGeom prst="rect">
+            <a:avLst/>
+          </a:prstGeom>
+        </p:spPr>
+      </p:pic>
     </p:spTree>
     <p:extLst>
       <p:ext uri="{BB962C8B-B14F-4D97-AF65-F5344CB8AC3E}">
-        <p14:creationId xmlns:p14="http://schemas.microsoft.com/office/powerpoint/2010/main" val="439058604"/>
+        <p14:creationId xmlns:p14="http://schemas.microsoft.com/office/powerpoint/2010/main" val="364002905"/>
       </p:ext>
     </p:extLst>
   </p:cSld>

</xml_diff>